<commit_message>
updated graph design according to comments
</commit_message>
<xml_diff>
--- a/ux_design/competition-graph-hifi-ui.pptx
+++ b/ux_design/competition-graph-hifi-ui.pptx
@@ -3933,7 +3933,7 @@
         <p:spPr>
           <a:xfrm>
             <a:off x="4044315" y="1727835"/>
-            <a:ext cx="4107815" cy="4423410"/>
+            <a:ext cx="4107815" cy="4745990"/>
           </a:xfrm>
           <a:prstGeom prst="roundRect">
             <a:avLst>
@@ -4026,7 +4026,7 @@
           <a:p>
             <a:r>
               <a:rPr lang="en-US" altLang="zh-CN" sz="1200"/>
-              <a:t>Company Name</a:t>
+              <a:t>Company Name *</a:t>
             </a:r>
             <a:endParaRPr lang="en-US" altLang="zh-CN" sz="1200"/>
           </a:p>
@@ -4107,7 +4107,7 @@
         </p:nvGrpSpPr>
         <p:grpSpPr>
           <a:xfrm>
-            <a:off x="4253865" y="3348990"/>
+            <a:off x="4253865" y="3937000"/>
             <a:ext cx="3656965" cy="662305"/>
             <a:chOff x="6699" y="5274"/>
             <a:chExt cx="5759" cy="1043"/>
@@ -4140,7 +4140,7 @@
             <a:p>
               <a:r>
                 <a:rPr lang="en-US" altLang="zh-CN" sz="1200"/>
-                <a:t>How many layers of relationship to expand</a:t>
+                <a:t>How many layers of relationship to expand *</a:t>
               </a:r>
               <a:endParaRPr lang="en-US" altLang="zh-CN" sz="1200"/>
             </a:p>
@@ -4435,7 +4435,7 @@
         </p:nvGrpSpPr>
         <p:grpSpPr>
           <a:xfrm>
-            <a:off x="4253865" y="4243705"/>
+            <a:off x="4253865" y="4831715"/>
             <a:ext cx="3656965" cy="662305"/>
             <a:chOff x="6699" y="5274"/>
             <a:chExt cx="5759" cy="1043"/>
@@ -4468,7 +4468,7 @@
             <a:p>
               <a:r>
                 <a:rPr lang="en-US" altLang="zh-CN" sz="1200"/>
-                <a:t>How many nodes to show per layer</a:t>
+                <a:t>How many nodes to show per layer *</a:t>
               </a:r>
               <a:endParaRPr lang="en-US" altLang="zh-CN" sz="1200"/>
             </a:p>
@@ -4767,7 +4767,7 @@
         </p:nvSpPr>
         <p:spPr>
           <a:xfrm>
-            <a:off x="5346065" y="5393690"/>
+            <a:off x="5320030" y="6004560"/>
             <a:ext cx="1534160" cy="293370"/>
           </a:xfrm>
           <a:prstGeom prst="roundRect">
@@ -4808,9 +4808,152 @@
           </a:p>
         </p:txBody>
       </p:sp>
+      <p:sp>
+        <p:nvSpPr>
+          <p:cNvPr id="2" name="文本框 1"/>
+          <p:cNvSpPr txBox="1"/>
+          <p:nvPr>
+            <p:custDataLst>
+              <p:tags r:id="rId20"/>
+            </p:custDataLst>
+          </p:nvPr>
+        </p:nvSpPr>
+        <p:spPr>
+          <a:xfrm>
+            <a:off x="4253865" y="3197860"/>
+            <a:ext cx="1898015" cy="275590"/>
+          </a:xfrm>
+          <a:prstGeom prst="rect">
+            <a:avLst/>
+          </a:prstGeom>
+          <a:noFill/>
+        </p:spPr>
+        <p:txBody>
+          <a:bodyPr wrap="square" rtlCol="0">
+            <a:spAutoFit/>
+          </a:bodyPr>
+          <a:p>
+            <a:r>
+              <a:rPr lang="en-US" altLang="zh-CN" sz="1200"/>
+              <a:t>Company Name</a:t>
+            </a:r>
+            <a:endParaRPr lang="en-US" altLang="zh-CN" sz="1200"/>
+          </a:p>
+        </p:txBody>
+      </p:sp>
+      <p:sp>
+        <p:nvSpPr>
+          <p:cNvPr id="3" name="圆角矩形 2"/>
+          <p:cNvSpPr/>
+          <p:nvPr>
+            <p:custDataLst>
+              <p:tags r:id="rId21"/>
+            </p:custDataLst>
+          </p:nvPr>
+        </p:nvSpPr>
+        <p:spPr>
+          <a:xfrm>
+            <a:off x="4314190" y="3513455"/>
+            <a:ext cx="3595370" cy="372110"/>
+          </a:xfrm>
+          <a:prstGeom prst="roundRect">
+            <a:avLst>
+              <a:gd name="adj" fmla="val 13993"/>
+            </a:avLst>
+          </a:prstGeom>
+          <a:solidFill>
+            <a:schemeClr val="bg1"/>
+          </a:solidFill>
+          <a:ln w="3175">
+            <a:solidFill>
+              <a:schemeClr val="tx1"/>
+            </a:solidFill>
+          </a:ln>
+        </p:spPr>
+        <p:style>
+          <a:lnRef idx="2">
+            <a:schemeClr val="accent1">
+              <a:shade val="50000"/>
+            </a:schemeClr>
+          </a:lnRef>
+          <a:fillRef idx="1">
+            <a:schemeClr val="accent1"/>
+          </a:fillRef>
+          <a:effectRef idx="0">
+            <a:schemeClr val="accent1"/>
+          </a:effectRef>
+          <a:fontRef idx="minor">
+            <a:schemeClr val="lt1"/>
+          </a:fontRef>
+        </p:style>
+        <p:txBody>
+          <a:bodyPr rtlCol="0" anchor="ctr"/>
+          <a:p>
+            <a:pPr algn="l"/>
+            <a:r>
+              <a:rPr lang="en-US" altLang="zh-CN" sz="1000" i="1">
+                <a:solidFill>
+                  <a:schemeClr val="tx1">
+                    <a:lumMod val="65000"/>
+                    <a:lumOff val="35000"/>
+                  </a:schemeClr>
+                </a:solidFill>
+              </a:rPr>
+              <a:t>Please select a category of relationship</a:t>
+            </a:r>
+            <a:endParaRPr lang="en-US" altLang="zh-CN" sz="1000" i="1">
+              <a:solidFill>
+                <a:schemeClr val="tx1">
+                  <a:lumMod val="65000"/>
+                  <a:lumOff val="35000"/>
+                </a:schemeClr>
+              </a:solidFill>
+            </a:endParaRPr>
+          </a:p>
+        </p:txBody>
+      </p:sp>
+      <p:sp>
+        <p:nvSpPr>
+          <p:cNvPr id="15" name="等腰三角形 14"/>
+          <p:cNvSpPr/>
+          <p:nvPr/>
+        </p:nvSpPr>
+        <p:spPr>
+          <a:xfrm rot="10800000">
+            <a:off x="7632700" y="3657600"/>
+            <a:ext cx="132080" cy="88265"/>
+          </a:xfrm>
+          <a:prstGeom prst="triangle">
+            <a:avLst/>
+          </a:prstGeom>
+        </p:spPr>
+        <p:style>
+          <a:lnRef idx="2">
+            <a:schemeClr val="dk1">
+              <a:shade val="50000"/>
+            </a:schemeClr>
+          </a:lnRef>
+          <a:fillRef idx="1">
+            <a:schemeClr val="dk1"/>
+          </a:fillRef>
+          <a:effectRef idx="0">
+            <a:schemeClr val="dk1"/>
+          </a:effectRef>
+          <a:fontRef idx="minor">
+            <a:schemeClr val="lt1"/>
+          </a:fontRef>
+        </p:style>
+        <p:txBody>
+          <a:bodyPr rtlCol="0" anchor="ctr"/>
+          <a:p>
+            <a:pPr algn="ctr"/>
+            <a:endParaRPr lang="zh-CN" altLang="en-US"/>
+          </a:p>
+        </p:txBody>
+      </p:sp>
     </p:spTree>
     <p:custDataLst>
-      <p:tags r:id="rId20"/>
+      <p:tags r:id="rId22"/>
     </p:custDataLst>
   </p:cSld>
   <p:clrMapOvr>
@@ -6034,6 +6177,18 @@
 
 <file path=ppt/tags/tag82.xml><?xml version="1.0" encoding="utf-8"?>
 <p:tagLst xmlns:p="http://schemas.openxmlformats.org/presentationml/2006/main">
+  <p:tag name="KSO_WM_BEAUTIFY_FLAG" val=""/>
+</p:tagLst>
+</file>
+
+<file path=ppt/tags/tag83.xml><?xml version="1.0" encoding="utf-8"?>
+<p:tagLst xmlns:p="http://schemas.openxmlformats.org/presentationml/2006/main">
+  <p:tag name="KSO_WM_BEAUTIFY_FLAG" val=""/>
+</p:tagLst>
+</file>
+
+<file path=ppt/tags/tag84.xml><?xml version="1.0" encoding="utf-8"?>
+<p:tagLst xmlns:p="http://schemas.openxmlformats.org/presentationml/2006/main">
   <p:tag name="KSO_WM_SLIDE_ID" val="custom20205176_1"/>
   <p:tag name="KSO_WM_TEMPLATE_SUBCATEGORY" val="19"/>
   <p:tag name="KSO_WM_TEMPLATE_MASTER_TYPE" val="0"/>
@@ -6053,25 +6208,25 @@
 </p:tagLst>
 </file>
 
-<file path=ppt/tags/tag83.xml><?xml version="1.0" encoding="utf-8"?>
+<file path=ppt/tags/tag85.xml><?xml version="1.0" encoding="utf-8"?>
 <p:tagLst xmlns:p="http://schemas.openxmlformats.org/presentationml/2006/main">
   <p:tag name="KSO_WM_BEAUTIFY_FLAG" val=""/>
 </p:tagLst>
 </file>
 
-<file path=ppt/tags/tag84.xml><?xml version="1.0" encoding="utf-8"?>
+<file path=ppt/tags/tag86.xml><?xml version="1.0" encoding="utf-8"?>
 <p:tagLst xmlns:p="http://schemas.openxmlformats.org/presentationml/2006/main">
   <p:tag name="KSO_WM_BEAUTIFY_FLAG" val=""/>
 </p:tagLst>
 </file>
 
-<file path=ppt/tags/tag85.xml><?xml version="1.0" encoding="utf-8"?>
+<file path=ppt/tags/tag87.xml><?xml version="1.0" encoding="utf-8"?>
 <p:tagLst xmlns:p="http://schemas.openxmlformats.org/presentationml/2006/main">
   <p:tag name="KSO_WM_BEAUTIFY_FLAG" val=""/>
 </p:tagLst>
 </file>
 
-<file path=ppt/tags/tag86.xml><?xml version="1.0" encoding="utf-8"?>
+<file path=ppt/tags/tag88.xml><?xml version="1.0" encoding="utf-8"?>
 <p:tagLst xmlns:p="http://schemas.openxmlformats.org/presentationml/2006/main">
   <p:tag name="KSO_WM_SLIDE_ID" val="custom20205176_1"/>
   <p:tag name="KSO_WM_TEMPLATE_SUBCATEGORY" val="19"/>
@@ -6092,9 +6247,10 @@
 </p:tagLst>
 </file>
 
-<file path=ppt/tags/tag87.xml><?xml version="1.0" encoding="utf-8"?>
-<p:tagLst xmlns:p="http://schemas.openxmlformats.org/presentationml/2006/main">
-  <p:tag name="COMMONDATA" val="eyJoZGlkIjoiMjIzOWY0NWUzNmU3YmYyMmRjOTYwN2EyZjM0Yzc4NzMifQ=="/>
+<file path=ppt/tags/tag89.xml><?xml version="1.0" encoding="utf-8"?>
+<p:tagLst xmlns:p="http://schemas.openxmlformats.org/presentationml/2006/main">
+  <p:tag name="COMMONDATA" val="eyJoZGlkIjoiM2JiOGI4OTY1ODUwZGRlN2RiYjljMjZmMzdmYzU3MTEifQ=="/>
+  <p:tag name="KSO_WPP_MARK_KEY" val="dfe6fe04-3240-4765-b630-c231caeda4cd"/>
 </p:tagLst>
 </file>
 

</xml_diff>